<commit_message>
Renamed presentation and added some notes.
</commit_message>
<xml_diff>
--- a/NET Code Testing.pptx
+++ b/NET Code Testing.pptx
@@ -212,7 +212,7 @@
           <a:p>
             <a:fld id="{BBB263FD-C177-455B-AE6A-FA2B045B2D79}" type="datetimeFigureOut">
               <a:rPr lang="ru-RU" smtClean="0"/>
-              <a:t>30.06.2015</a:t>
+              <a:t>01.07.2015</a:t>
             </a:fld>
             <a:endParaRPr lang="ru-RU"/>
           </a:p>
@@ -1456,7 +1456,7 @@
           <a:p>
             <a:fld id="{9D92CE5F-FE67-4FCE-9FEF-55BED055B1C3}" type="datetime1">
               <a:rPr lang="en-US" smtClean="0"/>
-              <a:t>6/30/2015</a:t>
+              <a:t>7/1/2015</a:t>
             </a:fld>
             <a:endParaRPr lang="en-US" dirty="0"/>
           </a:p>
@@ -1703,7 +1703,7 @@
           <a:p>
             <a:fld id="{19617365-F89F-46FA-B66C-1D5A472D3E89}" type="datetime1">
               <a:rPr lang="en-US" smtClean="0"/>
-              <a:t>6/30/2015</a:t>
+              <a:t>7/1/2015</a:t>
             </a:fld>
             <a:endParaRPr lang="en-US" dirty="0"/>
           </a:p>
@@ -2013,7 +2013,7 @@
           <a:p>
             <a:fld id="{BD85AC23-598F-466B-837A-AC6E05E07EBD}" type="datetime1">
               <a:rPr lang="en-US" smtClean="0"/>
-              <a:t>6/30/2015</a:t>
+              <a:t>7/1/2015</a:t>
             </a:fld>
             <a:endParaRPr lang="en-US" dirty="0"/>
           </a:p>
@@ -2336,7 +2336,7 @@
           <a:p>
             <a:fld id="{E14D6112-1736-4356-9A26-37ACBC559974}" type="datetime1">
               <a:rPr lang="en-US" smtClean="0"/>
-              <a:t>6/30/2015</a:t>
+              <a:t>7/1/2015</a:t>
             </a:fld>
             <a:endParaRPr lang="en-US" dirty="0"/>
           </a:p>
@@ -2646,7 +2646,7 @@
           <a:p>
             <a:fld id="{6DEFE684-BB0E-4AEC-A80C-6322066D33E3}" type="datetime1">
               <a:rPr lang="en-US" smtClean="0"/>
-              <a:t>6/30/2015</a:t>
+              <a:t>7/1/2015</a:t>
             </a:fld>
             <a:endParaRPr lang="en-US" dirty="0"/>
           </a:p>
@@ -3029,7 +3029,7 @@
           <a:p>
             <a:fld id="{6412E04B-14EF-4676-BC4B-5FC58E80084F}" type="datetime1">
               <a:rPr lang="en-US" smtClean="0"/>
-              <a:t>6/30/2015</a:t>
+              <a:t>7/1/2015</a:t>
             </a:fld>
             <a:endParaRPr lang="en-US" dirty="0"/>
           </a:p>
@@ -3195,7 +3195,7 @@
           <a:p>
             <a:fld id="{0DC5D9A8-1C10-48BF-AC9D-EA658C6BDB12}" type="datetime1">
               <a:rPr lang="en-US" smtClean="0"/>
-              <a:t>6/30/2015</a:t>
+              <a:t>7/1/2015</a:t>
             </a:fld>
             <a:endParaRPr lang="en-US" dirty="0"/>
           </a:p>
@@ -3370,7 +3370,7 @@
           <a:p>
             <a:fld id="{DEBB75F5-F2A3-43E7-A8C3-D91D6EA1288B}" type="datetime1">
               <a:rPr lang="en-US" smtClean="0"/>
-              <a:t>6/30/2015</a:t>
+              <a:t>7/1/2015</a:t>
             </a:fld>
             <a:endParaRPr lang="en-US" dirty="0"/>
           </a:p>
@@ -3542,7 +3542,7 @@
           <a:p>
             <a:fld id="{9CAF16FC-6547-4DA8-9622-73EDEF7EF1CB}" type="datetime1">
               <a:rPr lang="en-US" smtClean="0"/>
-              <a:t>6/30/2015</a:t>
+              <a:t>7/1/2015</a:t>
             </a:fld>
             <a:endParaRPr lang="en-US" dirty="0"/>
           </a:p>
@@ -3785,7 +3785,7 @@
           <a:p>
             <a:fld id="{2E0121FB-DACF-4B56-819C-77F73E0027DB}" type="datetime1">
               <a:rPr lang="en-US" smtClean="0"/>
-              <a:t>6/30/2015</a:t>
+              <a:t>7/1/2015</a:t>
             </a:fld>
             <a:endParaRPr lang="en-US" dirty="0"/>
           </a:p>
@@ -4013,7 +4013,7 @@
           <a:p>
             <a:fld id="{57003C1A-F986-44DF-BA98-089B1C7EE339}" type="datetime1">
               <a:rPr lang="en-US" smtClean="0"/>
-              <a:t>6/30/2015</a:t>
+              <a:t>7/1/2015</a:t>
             </a:fld>
             <a:endParaRPr lang="en-US" dirty="0"/>
           </a:p>
@@ -4382,7 +4382,7 @@
           <a:p>
             <a:fld id="{A5BE57BE-2F32-47B5-B6B5-1B971F4E6955}" type="datetime1">
               <a:rPr lang="en-US" smtClean="0"/>
-              <a:t>6/30/2015</a:t>
+              <a:t>7/1/2015</a:t>
             </a:fld>
             <a:endParaRPr lang="en-US" dirty="0"/>
           </a:p>
@@ -4501,7 +4501,7 @@
           <a:p>
             <a:fld id="{F9B65CFB-E320-4453-A53D-A2B57DF04655}" type="datetime1">
               <a:rPr lang="en-US" smtClean="0"/>
-              <a:t>6/30/2015</a:t>
+              <a:t>7/1/2015</a:t>
             </a:fld>
             <a:endParaRPr lang="en-US" dirty="0"/>
           </a:p>
@@ -4592,7 +4592,7 @@
           <a:p>
             <a:fld id="{F5D758D3-953F-4ED2-A4BE-60983E2FAD6F}" type="datetime1">
               <a:rPr lang="en-US" smtClean="0"/>
-              <a:t>6/30/2015</a:t>
+              <a:t>7/1/2015</a:t>
             </a:fld>
             <a:endParaRPr lang="en-US" dirty="0"/>
           </a:p>
@@ -4843,7 +4843,7 @@
           <a:p>
             <a:fld id="{EE5357AD-CFEA-414B-BE84-F031DD78955F}" type="datetime1">
               <a:rPr lang="en-US" smtClean="0"/>
-              <a:t>6/30/2015</a:t>
+              <a:t>7/1/2015</a:t>
             </a:fld>
             <a:endParaRPr lang="en-US" dirty="0"/>
           </a:p>
@@ -5101,7 +5101,7 @@
           <a:p>
             <a:fld id="{27D5D956-A80F-40D9-ADC6-63305397EB08}" type="datetime1">
               <a:rPr lang="en-US" smtClean="0"/>
-              <a:t>6/30/2015</a:t>
+              <a:t>7/1/2015</a:t>
             </a:fld>
             <a:endParaRPr lang="en-US" dirty="0"/>
           </a:p>
@@ -5842,7 +5842,7 @@
           <a:p>
             <a:fld id="{4E3467E5-E37D-4BF7-A555-9035E35FC2ED}" type="datetime1">
               <a:rPr lang="en-US" smtClean="0"/>
-              <a:t>6/30/2015</a:t>
+              <a:t>7/1/2015</a:t>
             </a:fld>
             <a:endParaRPr lang="en-US" dirty="0"/>
           </a:p>
@@ -10789,27 +10789,7 @@
                 <a:ea typeface="+mj-ea"/>
                 <a:cs typeface="+mj-cs"/>
               </a:rPr>
-              <a:t>Repository with lecture presentation and code exa</a:t>
-            </a:r>
-            <a:r>
-              <a:rPr lang="en-GB" sz="2400" dirty="0" smtClean="0">
-                <a:solidFill>
-                  <a:schemeClr val="tx2">
-                    <a:lumMod val="90000"/>
-                  </a:schemeClr>
-                </a:solidFill>
-                <a:effectLst>
-                  <a:outerShdw blurRad="38100" dist="38100" dir="2700000" algn="tl">
-                    <a:srgbClr val="000000">
-                      <a:alpha val="43137"/>
-                    </a:srgbClr>
-                  </a:outerShdw>
-                </a:effectLst>
-                <a:latin typeface="+mj-lt"/>
-                <a:ea typeface="+mj-ea"/>
-                <a:cs typeface="+mj-cs"/>
-              </a:rPr>
-              <a:t>mples:</a:t>
+              <a:t>Repository with lecture presentation and code examples:</a:t>
             </a:r>
           </a:p>
           <a:p>
@@ -13450,47 +13430,7 @@
                 <a:ea typeface="+mj-ea"/>
                 <a:cs typeface="+mj-cs"/>
               </a:rPr>
-              <a:t>A separate project </a:t>
-            </a:r>
-            <a:r>
-              <a:rPr lang="en-US" dirty="0" smtClean="0">
-                <a:solidFill>
-                  <a:schemeClr val="tx2">
-                    <a:lumMod val="90000"/>
-                  </a:schemeClr>
-                </a:solidFill>
-                <a:effectLst>
-                  <a:outerShdw blurRad="38100" dist="38100" dir="2700000" algn="tl">
-                    <a:srgbClr val="000000">
-                      <a:alpha val="43137"/>
-                    </a:srgbClr>
-                  </a:outerShdw>
-                </a:effectLst>
-                <a:latin typeface="+mj-lt"/>
-                <a:ea typeface="+mj-ea"/>
-                <a:cs typeface="+mj-cs"/>
-              </a:rPr>
-              <a:t>for </a:t>
-            </a:r>
-            <a:r>
-              <a:rPr lang="en-US" dirty="0" smtClean="0">
-                <a:solidFill>
-                  <a:schemeClr val="tx2">
-                    <a:lumMod val="90000"/>
-                  </a:schemeClr>
-                </a:solidFill>
-                <a:effectLst>
-                  <a:outerShdw blurRad="38100" dist="38100" dir="2700000" algn="tl">
-                    <a:srgbClr val="000000">
-                      <a:alpha val="43137"/>
-                    </a:srgbClr>
-                  </a:outerShdw>
-                </a:effectLst>
-                <a:latin typeface="+mj-lt"/>
-                <a:ea typeface="+mj-ea"/>
-                <a:cs typeface="+mj-cs"/>
-              </a:rPr>
-              <a:t>tests:</a:t>
+              <a:t>A separate project for tests:</a:t>
             </a:r>
             <a:endParaRPr lang="ru-RU" dirty="0">
               <a:solidFill>
@@ -15747,7 +15687,7 @@
         <p:spPr>
           <a:xfrm>
             <a:off x="2446770" y="1644417"/>
-            <a:ext cx="5057795" cy="3785652"/>
+            <a:ext cx="4921540" cy="3348481"/>
           </a:xfrm>
           <a:prstGeom prst="rect">
             <a:avLst/>
@@ -15762,7 +15702,7 @@
           <a:p>
             <a:pPr indent="-285750">
               <a:lnSpc>
-                <a:spcPct val="200000"/>
+                <a:spcPct val="150000"/>
               </a:lnSpc>
               <a:spcBef>
                 <a:spcPct val="0"/>
@@ -15811,7 +15751,7 @@
           <a:p>
             <a:pPr indent="-285750">
               <a:lnSpc>
-                <a:spcPct val="200000"/>
+                <a:spcPct val="150000"/>
               </a:lnSpc>
               <a:spcBef>
                 <a:spcPct val="0"/>
@@ -15837,7 +15777,59 @@
                 <a:ea typeface="+mj-ea"/>
                 <a:cs typeface="+mj-cs"/>
               </a:rPr>
-              <a:t>simple to understand</a:t>
+              <a:t>simple to </a:t>
+            </a:r>
+            <a:r>
+              <a:rPr lang="en-US" sz="2400" dirty="0" smtClean="0">
+                <a:solidFill>
+                  <a:schemeClr val="tx2">
+                    <a:lumMod val="90000"/>
+                  </a:schemeClr>
+                </a:solidFill>
+                <a:effectLst>
+                  <a:outerShdw blurRad="38100" dist="38100" dir="2700000" algn="tl">
+                    <a:srgbClr val="000000">
+                      <a:alpha val="43137"/>
+                    </a:srgbClr>
+                  </a:outerShdw>
+                </a:effectLst>
+                <a:latin typeface="+mj-lt"/>
+                <a:ea typeface="+mj-ea"/>
+                <a:cs typeface="+mj-cs"/>
+              </a:rPr>
+              <a:t>understand</a:t>
+            </a:r>
+          </a:p>
+          <a:p>
+            <a:pPr indent="-285750">
+              <a:lnSpc>
+                <a:spcPct val="150000"/>
+              </a:lnSpc>
+              <a:spcBef>
+                <a:spcPct val="0"/>
+              </a:spcBef>
+              <a:buFont typeface="Arial" panose="020B0604020202020204" pitchFamily="34" charset="0"/>
+              <a:buChar char="•"/>
+            </a:pPr>
+            <a:r>
+              <a:rPr lang="en-US" sz="2400" dirty="0" smtClean="0">
+                <a:solidFill>
+                  <a:schemeClr val="tx2">
+                    <a:lumMod val="90000"/>
+                  </a:schemeClr>
+                </a:solidFill>
+                <a:effectLst>
+                  <a:outerShdw blurRad="38100" dist="38100" dir="2700000" algn="tl">
+                    <a:srgbClr val="000000">
+                      <a:alpha val="43137"/>
+                    </a:srgbClr>
+                  </a:outerShdw>
+                </a:effectLst>
+                <a:latin typeface="+mj-lt"/>
+                <a:ea typeface="+mj-ea"/>
+                <a:cs typeface="+mj-cs"/>
+              </a:rPr>
+              <a:t>small</a:t>
             </a:r>
             <a:endParaRPr lang="en-US" sz="2400" dirty="0">
               <a:solidFill>
@@ -15860,7 +15852,7 @@
           <a:p>
             <a:pPr indent="-285750">
               <a:lnSpc>
-                <a:spcPct val="200000"/>
+                <a:spcPct val="150000"/>
               </a:lnSpc>
               <a:spcBef>
                 <a:spcPct val="0"/>
@@ -15909,7 +15901,7 @@
           <a:p>
             <a:pPr indent="-285750">
               <a:lnSpc>
-                <a:spcPct val="200000"/>
+                <a:spcPct val="150000"/>
               </a:lnSpc>
               <a:spcBef>
                 <a:spcPct val="0"/>
@@ -16001,7 +15993,7 @@
           <a:p>
             <a:pPr indent="-285750">
               <a:lnSpc>
-                <a:spcPct val="200000"/>
+                <a:spcPct val="150000"/>
               </a:lnSpc>
               <a:spcBef>
                 <a:spcPct val="0"/>

</xml_diff>

<commit_message>
Fixed link to demo teamcity.
</commit_message>
<xml_diff>
--- a/NET Code Testing.pptx
+++ b/NET Code Testing.pptx
@@ -212,7 +212,7 @@
           <a:p>
             <a:fld id="{BBB263FD-C177-455B-AE6A-FA2B045B2D79}" type="datetimeFigureOut">
               <a:rPr lang="ru-RU" smtClean="0"/>
-              <a:t>01.07.2015</a:t>
+              <a:t>07.07.2015</a:t>
             </a:fld>
             <a:endParaRPr lang="ru-RU"/>
           </a:p>
@@ -1456,7 +1456,7 @@
           <a:p>
             <a:fld id="{9D92CE5F-FE67-4FCE-9FEF-55BED055B1C3}" type="datetime1">
               <a:rPr lang="en-US" smtClean="0"/>
-              <a:t>7/1/2015</a:t>
+              <a:t>7/7/2015</a:t>
             </a:fld>
             <a:endParaRPr lang="en-US" dirty="0"/>
           </a:p>
@@ -1703,7 +1703,7 @@
           <a:p>
             <a:fld id="{19617365-F89F-46FA-B66C-1D5A472D3E89}" type="datetime1">
               <a:rPr lang="en-US" smtClean="0"/>
-              <a:t>7/1/2015</a:t>
+              <a:t>7/7/2015</a:t>
             </a:fld>
             <a:endParaRPr lang="en-US" dirty="0"/>
           </a:p>
@@ -2013,7 +2013,7 @@
           <a:p>
             <a:fld id="{BD85AC23-598F-466B-837A-AC6E05E07EBD}" type="datetime1">
               <a:rPr lang="en-US" smtClean="0"/>
-              <a:t>7/1/2015</a:t>
+              <a:t>7/7/2015</a:t>
             </a:fld>
             <a:endParaRPr lang="en-US" dirty="0"/>
           </a:p>
@@ -2336,7 +2336,7 @@
           <a:p>
             <a:fld id="{E14D6112-1736-4356-9A26-37ACBC559974}" type="datetime1">
               <a:rPr lang="en-US" smtClean="0"/>
-              <a:t>7/1/2015</a:t>
+              <a:t>7/7/2015</a:t>
             </a:fld>
             <a:endParaRPr lang="en-US" dirty="0"/>
           </a:p>
@@ -2646,7 +2646,7 @@
           <a:p>
             <a:fld id="{6DEFE684-BB0E-4AEC-A80C-6322066D33E3}" type="datetime1">
               <a:rPr lang="en-US" smtClean="0"/>
-              <a:t>7/1/2015</a:t>
+              <a:t>7/7/2015</a:t>
             </a:fld>
             <a:endParaRPr lang="en-US" dirty="0"/>
           </a:p>
@@ -3029,7 +3029,7 @@
           <a:p>
             <a:fld id="{6412E04B-14EF-4676-BC4B-5FC58E80084F}" type="datetime1">
               <a:rPr lang="en-US" smtClean="0"/>
-              <a:t>7/1/2015</a:t>
+              <a:t>7/7/2015</a:t>
             </a:fld>
             <a:endParaRPr lang="en-US" dirty="0"/>
           </a:p>
@@ -3195,7 +3195,7 @@
           <a:p>
             <a:fld id="{0DC5D9A8-1C10-48BF-AC9D-EA658C6BDB12}" type="datetime1">
               <a:rPr lang="en-US" smtClean="0"/>
-              <a:t>7/1/2015</a:t>
+              <a:t>7/7/2015</a:t>
             </a:fld>
             <a:endParaRPr lang="en-US" dirty="0"/>
           </a:p>
@@ -3370,7 +3370,7 @@
           <a:p>
             <a:fld id="{DEBB75F5-F2A3-43E7-A8C3-D91D6EA1288B}" type="datetime1">
               <a:rPr lang="en-US" smtClean="0"/>
-              <a:t>7/1/2015</a:t>
+              <a:t>7/7/2015</a:t>
             </a:fld>
             <a:endParaRPr lang="en-US" dirty="0"/>
           </a:p>
@@ -3542,7 +3542,7 @@
           <a:p>
             <a:fld id="{9CAF16FC-6547-4DA8-9622-73EDEF7EF1CB}" type="datetime1">
               <a:rPr lang="en-US" smtClean="0"/>
-              <a:t>7/1/2015</a:t>
+              <a:t>7/7/2015</a:t>
             </a:fld>
             <a:endParaRPr lang="en-US" dirty="0"/>
           </a:p>
@@ -3785,7 +3785,7 @@
           <a:p>
             <a:fld id="{2E0121FB-DACF-4B56-819C-77F73E0027DB}" type="datetime1">
               <a:rPr lang="en-US" smtClean="0"/>
-              <a:t>7/1/2015</a:t>
+              <a:t>7/7/2015</a:t>
             </a:fld>
             <a:endParaRPr lang="en-US" dirty="0"/>
           </a:p>
@@ -4013,7 +4013,7 @@
           <a:p>
             <a:fld id="{57003C1A-F986-44DF-BA98-089B1C7EE339}" type="datetime1">
               <a:rPr lang="en-US" smtClean="0"/>
-              <a:t>7/1/2015</a:t>
+              <a:t>7/7/2015</a:t>
             </a:fld>
             <a:endParaRPr lang="en-US" dirty="0"/>
           </a:p>
@@ -4382,7 +4382,7 @@
           <a:p>
             <a:fld id="{A5BE57BE-2F32-47B5-B6B5-1B971F4E6955}" type="datetime1">
               <a:rPr lang="en-US" smtClean="0"/>
-              <a:t>7/1/2015</a:t>
+              <a:t>7/7/2015</a:t>
             </a:fld>
             <a:endParaRPr lang="en-US" dirty="0"/>
           </a:p>
@@ -4501,7 +4501,7 @@
           <a:p>
             <a:fld id="{F9B65CFB-E320-4453-A53D-A2B57DF04655}" type="datetime1">
               <a:rPr lang="en-US" smtClean="0"/>
-              <a:t>7/1/2015</a:t>
+              <a:t>7/7/2015</a:t>
             </a:fld>
             <a:endParaRPr lang="en-US" dirty="0"/>
           </a:p>
@@ -4592,7 +4592,7 @@
           <a:p>
             <a:fld id="{F5D758D3-953F-4ED2-A4BE-60983E2FAD6F}" type="datetime1">
               <a:rPr lang="en-US" smtClean="0"/>
-              <a:t>7/1/2015</a:t>
+              <a:t>7/7/2015</a:t>
             </a:fld>
             <a:endParaRPr lang="en-US" dirty="0"/>
           </a:p>
@@ -4843,7 +4843,7 @@
           <a:p>
             <a:fld id="{EE5357AD-CFEA-414B-BE84-F031DD78955F}" type="datetime1">
               <a:rPr lang="en-US" smtClean="0"/>
-              <a:t>7/1/2015</a:t>
+              <a:t>7/7/2015</a:t>
             </a:fld>
             <a:endParaRPr lang="en-US" dirty="0"/>
           </a:p>
@@ -5101,7 +5101,7 @@
           <a:p>
             <a:fld id="{27D5D956-A80F-40D9-ADC6-63305397EB08}" type="datetime1">
               <a:rPr lang="en-US" smtClean="0"/>
-              <a:t>7/1/2015</a:t>
+              <a:t>7/7/2015</a:t>
             </a:fld>
             <a:endParaRPr lang="en-US" dirty="0"/>
           </a:p>
@@ -5842,7 +5842,7 @@
           <a:p>
             <a:fld id="{4E3467E5-E37D-4BF7-A555-9035E35FC2ED}" type="datetime1">
               <a:rPr lang="en-US" smtClean="0"/>
-              <a:t>7/1/2015</a:t>
+              <a:t>7/7/2015</a:t>
             </a:fld>
             <a:endParaRPr lang="en-US" dirty="0"/>
           </a:p>
@@ -9376,7 +9376,7 @@
         <p:spPr>
           <a:xfrm>
             <a:off x="1366614" y="3849515"/>
-            <a:ext cx="6010876" cy="461665"/>
+            <a:ext cx="7185878" cy="461665"/>
           </a:xfrm>
           <a:prstGeom prst="rect">
             <a:avLst/>
@@ -9415,7 +9415,7 @@
               <a:t>Demo on </a:t>
             </a:r>
             <a:r>
-              <a:rPr lang="en-US" sz="2400" dirty="0">
+              <a:rPr lang="en-US" sz="2400" dirty="0" smtClean="0">
                 <a:solidFill>
                   <a:schemeClr val="tx2">
                     <a:lumMod val="90000"/>
@@ -9433,28 +9433,7 @@
                 <a:cs typeface="+mj-cs"/>
                 <a:hlinkClick r:id="rId2"/>
               </a:rPr>
-              <a:t>https://teamcity.jetbrains.com</a:t>
-            </a:r>
-            <a:r>
-              <a:rPr lang="en-US" sz="2400" dirty="0" smtClean="0">
-                <a:solidFill>
-                  <a:schemeClr val="tx2">
-                    <a:lumMod val="90000"/>
-                  </a:schemeClr>
-                </a:solidFill>
-                <a:effectLst>
-                  <a:outerShdw blurRad="38100" dist="38100" dir="2700000" algn="tl">
-                    <a:srgbClr val="000000">
-                      <a:alpha val="43137"/>
-                    </a:srgbClr>
-                  </a:outerShdw>
-                </a:effectLst>
-                <a:latin typeface="+mj-lt"/>
-                <a:ea typeface="+mj-ea"/>
-                <a:cs typeface="+mj-cs"/>
-                <a:hlinkClick r:id="rId2"/>
-              </a:rPr>
-              <a:t>/</a:t>
+              <a:t>https://teamcity.jetbrains.com/?guest=1</a:t>
             </a:r>
             <a:endParaRPr lang="ru-RU" sz="2400" dirty="0">
               <a:solidFill>
@@ -15777,27 +15756,7 @@
                 <a:ea typeface="+mj-ea"/>
                 <a:cs typeface="+mj-cs"/>
               </a:rPr>
-              <a:t>simple to </a:t>
-            </a:r>
-            <a:r>
-              <a:rPr lang="en-US" sz="2400" dirty="0" smtClean="0">
-                <a:solidFill>
-                  <a:schemeClr val="tx2">
-                    <a:lumMod val="90000"/>
-                  </a:schemeClr>
-                </a:solidFill>
-                <a:effectLst>
-                  <a:outerShdw blurRad="38100" dist="38100" dir="2700000" algn="tl">
-                    <a:srgbClr val="000000">
-                      <a:alpha val="43137"/>
-                    </a:srgbClr>
-                  </a:outerShdw>
-                </a:effectLst>
-                <a:latin typeface="+mj-lt"/>
-                <a:ea typeface="+mj-ea"/>
-                <a:cs typeface="+mj-cs"/>
-              </a:rPr>
-              <a:t>understand</a:t>
+              <a:t>simple to understand</a:t>
             </a:r>
           </a:p>
           <a:p>

</xml_diff>